<commit_message>
Fix typos. Revise PlantUML to keep Employee/Manager order. Add visualization of coupling/cohesion tradeoff.
</commit_message>
<xml_diff>
--- a/ClassMaterials/CohesionAndCoupling/Slides/Part2-OOD-DP4-TellDoNotAsk.pptx
+++ b/ClassMaterials/CohesionAndCoupling/Slides/Part2-OOD-DP4-TellDoNotAsk.pptx
@@ -312,7 +312,7 @@
           <a:p>
             <a:fld id="{11374350-B736-4AC1-A1E7-19777DF1B0E1}" type="datetimeFigureOut">
               <a:rPr lang="en-US" smtClean="0"/>
-              <a:t>11/20/22</a:t>
+              <a:t>8/11/2023</a:t>
             </a:fld>
             <a:endParaRPr lang="en-US"/>
           </a:p>
@@ -1217,12 +1217,195 @@
           <a:p>
             <a:pPr rtl="0"/>
             <a:r>
-              <a:rPr lang="en-US" baseline="0" dirty="0">
-                <a:sym typeface="Wingdings" panose="05000000000000000000" pitchFamily="2" charset="2"/>
-              </a:rPr>
-              <a:t>Manager and Employee are flipped, might be worth re-creating</a:t>
+              <a:rPr lang="en-US" dirty="0"/>
+              <a:t>@startuml</a:t>
+            </a:r>
+          </a:p>
+          <a:p>
+            <a:pPr rtl="0"/>
+            <a:r>
+              <a:rPr lang="en-US" dirty="0" err="1"/>
+              <a:t>skinparam</a:t>
+            </a:r>
+            <a:r>
+              <a:rPr lang="en-US" dirty="0"/>
+              <a:t> style </a:t>
+            </a:r>
+            <a:r>
+              <a:rPr lang="en-US" dirty="0" err="1"/>
+              <a:t>strictuml</a:t>
             </a:r>
             <a:endParaRPr lang="en-US" dirty="0"/>
+          </a:p>
+          <a:p>
+            <a:pPr rtl="0"/>
+            <a:endParaRPr lang="en-US" dirty="0"/>
+          </a:p>
+          <a:p>
+            <a:pPr rtl="0"/>
+            <a:r>
+              <a:rPr lang="en-US" dirty="0"/>
+              <a:t>class Main {</a:t>
+            </a:r>
+          </a:p>
+          <a:p>
+            <a:pPr rtl="0"/>
+            <a:r>
+              <a:rPr lang="en-US" dirty="0" err="1"/>
+              <a:t>handleUpdateEmployeeSalary</a:t>
+            </a:r>
+            <a:r>
+              <a:rPr lang="en-US" dirty="0"/>
+              <a:t>(name, salary)</a:t>
+            </a:r>
+          </a:p>
+          <a:p>
+            <a:pPr rtl="0"/>
+            <a:r>
+              <a:rPr lang="en-US" dirty="0" err="1"/>
+              <a:t>handleGetSalary</a:t>
+            </a:r>
+            <a:r>
+              <a:rPr lang="en-US" dirty="0"/>
+              <a:t>(name): double</a:t>
+            </a:r>
+          </a:p>
+          <a:p>
+            <a:pPr rtl="0"/>
+            <a:r>
+              <a:rPr lang="en-US" dirty="0"/>
+              <a:t>}</a:t>
+            </a:r>
+          </a:p>
+          <a:p>
+            <a:pPr rtl="0"/>
+            <a:endParaRPr lang="en-US" dirty="0"/>
+          </a:p>
+          <a:p>
+            <a:pPr rtl="0"/>
+            <a:r>
+              <a:rPr lang="en-US" dirty="0"/>
+              <a:t>class Manager {</a:t>
+            </a:r>
+          </a:p>
+          <a:p>
+            <a:pPr rtl="0"/>
+            <a:r>
+              <a:rPr lang="en-US" dirty="0"/>
+              <a:t>  name: String</a:t>
+            </a:r>
+          </a:p>
+          <a:p>
+            <a:pPr rtl="0"/>
+            <a:r>
+              <a:rPr lang="en-US" dirty="0"/>
+              <a:t>  </a:t>
+            </a:r>
+            <a:r>
+              <a:rPr lang="en-US" dirty="0" err="1"/>
+              <a:t>calculateSalary</a:t>
+            </a:r>
+            <a:r>
+              <a:rPr lang="en-US" dirty="0"/>
+              <a:t>(): double</a:t>
+            </a:r>
+          </a:p>
+          <a:p>
+            <a:pPr rtl="0"/>
+            <a:r>
+              <a:rPr lang="en-US" dirty="0"/>
+              <a:t>}</a:t>
+            </a:r>
+          </a:p>
+          <a:p>
+            <a:pPr rtl="0"/>
+            <a:endParaRPr lang="en-US" dirty="0"/>
+          </a:p>
+          <a:p>
+            <a:pPr rtl="0"/>
+            <a:r>
+              <a:rPr lang="en-US" dirty="0"/>
+              <a:t>class Employee {</a:t>
+            </a:r>
+          </a:p>
+          <a:p>
+            <a:pPr rtl="0"/>
+            <a:r>
+              <a:rPr lang="en-US" dirty="0"/>
+              <a:t>  name: String</a:t>
+            </a:r>
+          </a:p>
+          <a:p>
+            <a:pPr rtl="0"/>
+            <a:r>
+              <a:rPr lang="en-US" dirty="0"/>
+              <a:t>  salary: double</a:t>
+            </a:r>
+          </a:p>
+          <a:p>
+            <a:pPr rtl="0"/>
+            <a:r>
+              <a:rPr lang="en-US" dirty="0"/>
+              <a:t>  </a:t>
+            </a:r>
+            <a:r>
+              <a:rPr lang="en-US" dirty="0" err="1"/>
+              <a:t>setSalary</a:t>
+            </a:r>
+            <a:r>
+              <a:rPr lang="en-US" dirty="0"/>
+              <a:t>(salary: double)</a:t>
+            </a:r>
+          </a:p>
+          <a:p>
+            <a:pPr rtl="0"/>
+            <a:r>
+              <a:rPr lang="en-US" dirty="0"/>
+              <a:t>  </a:t>
+            </a:r>
+            <a:r>
+              <a:rPr lang="en-US" dirty="0" err="1"/>
+              <a:t>getSalary</a:t>
+            </a:r>
+            <a:r>
+              <a:rPr lang="en-US" dirty="0"/>
+              <a:t>(): double</a:t>
+            </a:r>
+          </a:p>
+          <a:p>
+            <a:pPr rtl="0"/>
+            <a:r>
+              <a:rPr lang="en-US" dirty="0"/>
+              <a:t>}</a:t>
+            </a:r>
+          </a:p>
+          <a:p>
+            <a:pPr rtl="0"/>
+            <a:r>
+              <a:rPr lang="en-US" dirty="0"/>
+              <a:t>Main -right-&gt; "*" Employee</a:t>
+            </a:r>
+          </a:p>
+          <a:p>
+            <a:pPr rtl="0"/>
+            <a:r>
+              <a:rPr lang="en-US" dirty="0"/>
+              <a:t>Manager -left-&gt; "*" Employee</a:t>
+            </a:r>
+          </a:p>
+          <a:p>
+            <a:pPr rtl="0"/>
+            <a:r>
+              <a:rPr lang="en-US" dirty="0"/>
+              <a:t>Main -right-&gt; "*" Manager</a:t>
+            </a:r>
+          </a:p>
+          <a:p>
+            <a:pPr rtl="0"/>
+            <a:r>
+              <a:rPr lang="en-US" dirty="0"/>
+              <a:t>@enduml</a:t>
+            </a:r>
           </a:p>
         </p:txBody>
       </p:sp>
@@ -3706,7 +3889,7 @@
           <a:p>
             <a:fld id="{50A519B0-864F-436F-AD10-563B5AD2C023}" type="datetimeFigureOut">
               <a:rPr lang="en-US" smtClean="0"/>
-              <a:t>11/20/22</a:t>
+              <a:t>8/11/2023</a:t>
             </a:fld>
             <a:endParaRPr lang="en-US"/>
           </a:p>
@@ -3874,7 +4057,7 @@
           <a:p>
             <a:fld id="{50A519B0-864F-436F-AD10-563B5AD2C023}" type="datetimeFigureOut">
               <a:rPr lang="en-US" smtClean="0"/>
-              <a:t>11/20/22</a:t>
+              <a:t>8/11/2023</a:t>
             </a:fld>
             <a:endParaRPr lang="en-US"/>
           </a:p>
@@ -4052,7 +4235,7 @@
           <a:p>
             <a:fld id="{50A519B0-864F-436F-AD10-563B5AD2C023}" type="datetimeFigureOut">
               <a:rPr lang="en-US" smtClean="0"/>
-              <a:t>11/20/22</a:t>
+              <a:t>8/11/2023</a:t>
             </a:fld>
             <a:endParaRPr lang="en-US"/>
           </a:p>
@@ -4220,7 +4403,7 @@
           <a:p>
             <a:fld id="{50A519B0-864F-436F-AD10-563B5AD2C023}" type="datetimeFigureOut">
               <a:rPr lang="en-US" smtClean="0"/>
-              <a:t>11/20/22</a:t>
+              <a:t>8/11/2023</a:t>
             </a:fld>
             <a:endParaRPr lang="en-US"/>
           </a:p>
@@ -4465,7 +4648,7 @@
           <a:p>
             <a:fld id="{50A519B0-864F-436F-AD10-563B5AD2C023}" type="datetimeFigureOut">
               <a:rPr lang="en-US" smtClean="0"/>
-              <a:t>11/20/22</a:t>
+              <a:t>8/11/2023</a:t>
             </a:fld>
             <a:endParaRPr lang="en-US"/>
           </a:p>
@@ -4750,7 +4933,7 @@
           <a:p>
             <a:fld id="{50A519B0-864F-436F-AD10-563B5AD2C023}" type="datetimeFigureOut">
               <a:rPr lang="en-US" smtClean="0"/>
-              <a:t>11/20/22</a:t>
+              <a:t>8/11/2023</a:t>
             </a:fld>
             <a:endParaRPr lang="en-US"/>
           </a:p>
@@ -5169,7 +5352,7 @@
           <a:p>
             <a:fld id="{50A519B0-864F-436F-AD10-563B5AD2C023}" type="datetimeFigureOut">
               <a:rPr lang="en-US" smtClean="0"/>
-              <a:t>11/20/22</a:t>
+              <a:t>8/11/2023</a:t>
             </a:fld>
             <a:endParaRPr lang="en-US"/>
           </a:p>
@@ -5286,7 +5469,7 @@
           <a:p>
             <a:fld id="{50A519B0-864F-436F-AD10-563B5AD2C023}" type="datetimeFigureOut">
               <a:rPr lang="en-US" smtClean="0"/>
-              <a:t>11/20/22</a:t>
+              <a:t>8/11/2023</a:t>
             </a:fld>
             <a:endParaRPr lang="en-US"/>
           </a:p>
@@ -5381,7 +5564,7 @@
           <a:p>
             <a:fld id="{50A519B0-864F-436F-AD10-563B5AD2C023}" type="datetimeFigureOut">
               <a:rPr lang="en-US" smtClean="0"/>
-              <a:t>11/20/22</a:t>
+              <a:t>8/11/2023</a:t>
             </a:fld>
             <a:endParaRPr lang="en-US"/>
           </a:p>
@@ -5656,7 +5839,7 @@
           <a:p>
             <a:fld id="{50A519B0-864F-436F-AD10-563B5AD2C023}" type="datetimeFigureOut">
               <a:rPr lang="en-US" smtClean="0"/>
-              <a:t>11/20/22</a:t>
+              <a:t>8/11/2023</a:t>
             </a:fld>
             <a:endParaRPr lang="en-US"/>
           </a:p>
@@ -5908,7 +6091,7 @@
           <a:p>
             <a:fld id="{50A519B0-864F-436F-AD10-563B5AD2C023}" type="datetimeFigureOut">
               <a:rPr lang="en-US" smtClean="0"/>
-              <a:t>11/20/22</a:t>
+              <a:t>8/11/2023</a:t>
             </a:fld>
             <a:endParaRPr lang="en-US"/>
           </a:p>
@@ -6119,7 +6302,7 @@
           <a:p>
             <a:fld id="{50A519B0-864F-436F-AD10-563B5AD2C023}" type="datetimeFigureOut">
               <a:rPr lang="en-US" smtClean="0"/>
-              <a:t>11/20/22</a:t>
+              <a:t>8/11/2023</a:t>
             </a:fld>
             <a:endParaRPr lang="en-US"/>
           </a:p>
@@ -8834,45 +9017,38 @@
       </p:sp>
       <p:pic>
         <p:nvPicPr>
-          <p:cNvPr id="3" name="Picture 2" descr="https://lh6.googleusercontent.com/RDfrU9GrvrHp9Xi4AUeFnx1Id0j9Eu8KsvyLcYfC3MaO1TMzis95pHYmzJGZ7Gbl4BkgBlF2dGfjBbgtjz0vZ41bdg22d8pLoBuisa9Ilkq2vpDtRHdXQOtMXW-SbrJzauCHYumm">
-            <a:hlinkClick r:id="rId3"/>
+          <p:cNvPr id="6" name="Picture 5" descr="A diagram of a workflow&#10;&#10;Description automatically generated">
+            <a:extLst>
+              <a:ext uri="{FF2B5EF4-FFF2-40B4-BE49-F238E27FC236}">
+                <a16:creationId xmlns:a16="http://schemas.microsoft.com/office/drawing/2014/main" id="{693FB2E2-9F0E-970E-6724-25C97FFB0444}"/>
+              </a:ext>
+            </a:extLst>
           </p:cNvPr>
           <p:cNvPicPr>
-            <a:picLocks noChangeAspect="1" noChangeArrowheads="1"/>
+            <a:picLocks noChangeAspect="1"/>
           </p:cNvPicPr>
           <p:nvPr/>
         </p:nvPicPr>
         <p:blipFill>
-          <a:blip r:embed="rId4">
+          <a:blip r:embed="rId3">
             <a:extLst>
               <a:ext uri="{28A0092B-C50C-407E-A947-70E740481C1C}">
                 <a14:useLocalDpi xmlns:a14="http://schemas.microsoft.com/office/drawing/2010/main" val="0"/>
               </a:ext>
             </a:extLst>
           </a:blip>
-          <a:srcRect/>
           <a:stretch>
             <a:fillRect/>
           </a:stretch>
         </p:blipFill>
-        <p:spPr bwMode="auto">
+        <p:spPr>
           <a:xfrm>
-            <a:off x="505312" y="1417638"/>
-            <a:ext cx="5578472" cy="1255309"/>
+            <a:off x="441358" y="1539558"/>
+            <a:ext cx="8413684" cy="1858962"/>
           </a:xfrm>
           <a:prstGeom prst="rect">
             <a:avLst/>
           </a:prstGeom>
-          <a:noFill/>
-          <a:extLst>
-            <a:ext uri="{909E8E84-426E-40DD-AFC4-6F175D3DCCD1}">
-              <a14:hiddenFill xmlns:a14="http://schemas.microsoft.com/office/drawing/2010/main">
-                <a:solidFill>
-                  <a:srgbClr val="FFFFFF"/>
-                </a:solidFill>
-              </a14:hiddenFill>
-            </a:ext>
-          </a:extLst>
         </p:spPr>
       </p:pic>
     </p:spTree>
@@ -8953,19 +9129,14 @@
             </a:r>
             <a:r>
               <a:rPr lang="en-US" dirty="0"/>
-              <a:t> between objects when it does not disrupt usability or </a:t>
-            </a:r>
-            <a:r>
-              <a:rPr lang="en-US" dirty="0" err="1"/>
-              <a:t>extendability</a:t>
-            </a:r>
-            <a:endParaRPr lang="en-US" dirty="0"/>
+              <a:t> between objects when it does not disrupt usability or extendibility</a:t>
+            </a:r>
           </a:p>
           <a:p>
             <a:pPr lvl="1" fontAlgn="base"/>
             <a:r>
               <a:rPr lang="en-US" dirty="0"/>
-              <a:t>If you can see a simpler design that works use it</a:t>
+              <a:t>If you can see a simpler design that works, use it</a:t>
             </a:r>
           </a:p>
           <a:p>

</xml_diff>